<commit_message>
archieve after the reply
</commit_message>
<xml_diff>
--- a/PPT/毕业论文答辩.pptx
+++ b/PPT/毕业论文答辩.pptx
@@ -5,7 +5,7 @@
     <p:sldMasterId id="2147483648" r:id="rId1"/>
   </p:sldMasterIdLst>
   <p:notesMasterIdLst>
-    <p:notesMasterId r:id="rId26"/>
+    <p:notesMasterId r:id="rId27"/>
   </p:notesMasterIdLst>
   <p:sldIdLst>
     <p:sldId id="256" r:id="rId2"/>
@@ -18,20 +18,21 @@
     <p:sldId id="285" r:id="rId9"/>
     <p:sldId id="260" r:id="rId10"/>
     <p:sldId id="265" r:id="rId11"/>
-    <p:sldId id="268" r:id="rId12"/>
-    <p:sldId id="287" r:id="rId13"/>
-    <p:sldId id="288" r:id="rId14"/>
-    <p:sldId id="266" r:id="rId15"/>
-    <p:sldId id="282" r:id="rId16"/>
-    <p:sldId id="267" r:id="rId17"/>
-    <p:sldId id="278" r:id="rId18"/>
-    <p:sldId id="290" r:id="rId19"/>
-    <p:sldId id="291" r:id="rId20"/>
-    <p:sldId id="292" r:id="rId21"/>
-    <p:sldId id="293" r:id="rId22"/>
-    <p:sldId id="294" r:id="rId23"/>
-    <p:sldId id="283" r:id="rId24"/>
-    <p:sldId id="284" r:id="rId25"/>
+    <p:sldId id="295" r:id="rId12"/>
+    <p:sldId id="268" r:id="rId13"/>
+    <p:sldId id="287" r:id="rId14"/>
+    <p:sldId id="288" r:id="rId15"/>
+    <p:sldId id="266" r:id="rId16"/>
+    <p:sldId id="282" r:id="rId17"/>
+    <p:sldId id="267" r:id="rId18"/>
+    <p:sldId id="278" r:id="rId19"/>
+    <p:sldId id="290" r:id="rId20"/>
+    <p:sldId id="291" r:id="rId21"/>
+    <p:sldId id="292" r:id="rId22"/>
+    <p:sldId id="293" r:id="rId23"/>
+    <p:sldId id="294" r:id="rId24"/>
+    <p:sldId id="283" r:id="rId25"/>
+    <p:sldId id="284" r:id="rId26"/>
   </p:sldIdLst>
   <p:sldSz cx="12192000" cy="6858000"/>
   <p:notesSz cx="6858000" cy="9144000"/>
@@ -220,7 +221,7 @@
           <a:p>
             <a:fld id="{726C36A3-AD1C-4CFD-BD40-F4F62AFEF488}" type="datetimeFigureOut">
               <a:rPr lang="zh-CN" altLang="en-US" smtClean="0"/>
-              <a:t>2020/5/21</a:t>
+              <a:t>2020/5/29</a:t>
             </a:fld>
             <a:endParaRPr lang="zh-CN" altLang="en-US"/>
           </a:p>
@@ -718,7 +719,7 @@
           <a:p>
             <a:fld id="{BB3D494A-48D2-4A2A-A31C-4C311A8F6AC0}" type="datetimeFigureOut">
               <a:rPr lang="zh-CN" altLang="en-US" smtClean="0"/>
-              <a:t>2020/5/21</a:t>
+              <a:t>2020/5/29</a:t>
             </a:fld>
             <a:endParaRPr lang="zh-CN" altLang="en-US"/>
           </a:p>
@@ -916,7 +917,7 @@
           <a:p>
             <a:fld id="{BB3D494A-48D2-4A2A-A31C-4C311A8F6AC0}" type="datetimeFigureOut">
               <a:rPr lang="zh-CN" altLang="en-US" smtClean="0"/>
-              <a:t>2020/5/21</a:t>
+              <a:t>2020/5/29</a:t>
             </a:fld>
             <a:endParaRPr lang="zh-CN" altLang="en-US"/>
           </a:p>
@@ -1124,7 +1125,7 @@
           <a:p>
             <a:fld id="{BB3D494A-48D2-4A2A-A31C-4C311A8F6AC0}" type="datetimeFigureOut">
               <a:rPr lang="zh-CN" altLang="en-US" smtClean="0"/>
-              <a:t>2020/5/21</a:t>
+              <a:t>2020/5/29</a:t>
             </a:fld>
             <a:endParaRPr lang="zh-CN" altLang="en-US"/>
           </a:p>
@@ -1322,7 +1323,7 @@
           <a:p>
             <a:fld id="{BB3D494A-48D2-4A2A-A31C-4C311A8F6AC0}" type="datetimeFigureOut">
               <a:rPr lang="zh-CN" altLang="en-US" smtClean="0"/>
-              <a:t>2020/5/21</a:t>
+              <a:t>2020/5/29</a:t>
             </a:fld>
             <a:endParaRPr lang="zh-CN" altLang="en-US"/>
           </a:p>
@@ -1597,7 +1598,7 @@
           <a:p>
             <a:fld id="{BB3D494A-48D2-4A2A-A31C-4C311A8F6AC0}" type="datetimeFigureOut">
               <a:rPr lang="zh-CN" altLang="en-US" smtClean="0"/>
-              <a:t>2020/5/21</a:t>
+              <a:t>2020/5/29</a:t>
             </a:fld>
             <a:endParaRPr lang="zh-CN" altLang="en-US"/>
           </a:p>
@@ -1862,7 +1863,7 @@
           <a:p>
             <a:fld id="{BB3D494A-48D2-4A2A-A31C-4C311A8F6AC0}" type="datetimeFigureOut">
               <a:rPr lang="zh-CN" altLang="en-US" smtClean="0"/>
-              <a:t>2020/5/21</a:t>
+              <a:t>2020/5/29</a:t>
             </a:fld>
             <a:endParaRPr lang="zh-CN" altLang="en-US"/>
           </a:p>
@@ -2274,7 +2275,7 @@
           <a:p>
             <a:fld id="{BB3D494A-48D2-4A2A-A31C-4C311A8F6AC0}" type="datetimeFigureOut">
               <a:rPr lang="zh-CN" altLang="en-US" smtClean="0"/>
-              <a:t>2020/5/21</a:t>
+              <a:t>2020/5/29</a:t>
             </a:fld>
             <a:endParaRPr lang="zh-CN" altLang="en-US"/>
           </a:p>
@@ -2415,7 +2416,7 @@
           <a:p>
             <a:fld id="{BB3D494A-48D2-4A2A-A31C-4C311A8F6AC0}" type="datetimeFigureOut">
               <a:rPr lang="zh-CN" altLang="en-US" smtClean="0"/>
-              <a:t>2020/5/21</a:t>
+              <a:t>2020/5/29</a:t>
             </a:fld>
             <a:endParaRPr lang="zh-CN" altLang="en-US"/>
           </a:p>
@@ -2528,7 +2529,7 @@
           <a:p>
             <a:fld id="{BB3D494A-48D2-4A2A-A31C-4C311A8F6AC0}" type="datetimeFigureOut">
               <a:rPr lang="zh-CN" altLang="en-US" smtClean="0"/>
-              <a:t>2020/5/21</a:t>
+              <a:t>2020/5/29</a:t>
             </a:fld>
             <a:endParaRPr lang="zh-CN" altLang="en-US"/>
           </a:p>
@@ -2839,7 +2840,7 @@
           <a:p>
             <a:fld id="{BB3D494A-48D2-4A2A-A31C-4C311A8F6AC0}" type="datetimeFigureOut">
               <a:rPr lang="zh-CN" altLang="en-US" smtClean="0"/>
-              <a:t>2020/5/21</a:t>
+              <a:t>2020/5/29</a:t>
             </a:fld>
             <a:endParaRPr lang="zh-CN" altLang="en-US"/>
           </a:p>
@@ -3127,7 +3128,7 @@
           <a:p>
             <a:fld id="{BB3D494A-48D2-4A2A-A31C-4C311A8F6AC0}" type="datetimeFigureOut">
               <a:rPr lang="zh-CN" altLang="en-US" smtClean="0"/>
-              <a:t>2020/5/21</a:t>
+              <a:t>2020/5/29</a:t>
             </a:fld>
             <a:endParaRPr lang="zh-CN" altLang="en-US"/>
           </a:p>
@@ -3368,7 +3369,7 @@
           <a:p>
             <a:fld id="{BB3D494A-48D2-4A2A-A31C-4C311A8F6AC0}" type="datetimeFigureOut">
               <a:rPr lang="zh-CN" altLang="en-US" smtClean="0"/>
-              <a:t>2020/5/21</a:t>
+              <a:t>2020/5/29</a:t>
             </a:fld>
             <a:endParaRPr lang="zh-CN" altLang="en-US"/>
           </a:p>
@@ -4006,6 +4007,198 @@
           <p:cNvPr id="2" name="标题 1">
             <a:extLst>
               <a:ext uri="{FF2B5EF4-FFF2-40B4-BE49-F238E27FC236}">
+                <a16:creationId xmlns:a16="http://schemas.microsoft.com/office/drawing/2014/main" id="{278FBB30-08C5-4DBB-80E4-6D03DC51A0C5}"/>
+              </a:ext>
+            </a:extLst>
+          </p:cNvPr>
+          <p:cNvSpPr>
+            <a:spLocks noGrp="1"/>
+          </p:cNvSpPr>
+          <p:nvPr>
+            <p:ph type="title"/>
+          </p:nvPr>
+        </p:nvSpPr>
+        <p:spPr/>
+        <p:txBody>
+          <a:bodyPr/>
+          <a:lstStyle/>
+          <a:p>
+            <a:r>
+              <a:rPr lang="zh-CN" altLang="en-US" dirty="0"/>
+              <a:t>重组糖（现有工作）</a:t>
+            </a:r>
+          </a:p>
+        </p:txBody>
+      </p:sp>
+      <p:sp>
+        <p:nvSpPr>
+          <p:cNvPr id="3" name="内容占位符 2">
+            <a:extLst>
+              <a:ext uri="{FF2B5EF4-FFF2-40B4-BE49-F238E27FC236}">
+                <a16:creationId xmlns:a16="http://schemas.microsoft.com/office/drawing/2014/main" id="{F48F3D9E-91F0-496C-B7EC-5AB6B63ED031}"/>
+              </a:ext>
+            </a:extLst>
+          </p:cNvPr>
+          <p:cNvSpPr>
+            <a:spLocks noGrp="1"/>
+          </p:cNvSpPr>
+          <p:nvPr>
+            <p:ph idx="1"/>
+          </p:nvPr>
+        </p:nvSpPr>
+        <p:spPr/>
+        <p:txBody>
+          <a:bodyPr/>
+          <a:lstStyle/>
+          <a:p>
+            <a:r>
+              <a:rPr lang="en-US" altLang="zh-CN" dirty="0" err="1"/>
+              <a:t>Pombrio</a:t>
+            </a:r>
+            <a:r>
+              <a:rPr lang="en-US" altLang="zh-CN" dirty="0"/>
+              <a:t> and </a:t>
+            </a:r>
+            <a:r>
+              <a:rPr lang="en-US" altLang="zh-CN" dirty="0" err="1"/>
+              <a:t>Krishnamurthi</a:t>
+            </a:r>
+            <a:r>
+              <a:rPr lang="en-US" altLang="zh-CN" dirty="0"/>
+              <a:t> </a:t>
+            </a:r>
+            <a:r>
+              <a:rPr lang="zh-CN" altLang="en-US" dirty="0"/>
+              <a:t>在</a:t>
+            </a:r>
+            <a:r>
+              <a:rPr lang="en-US" altLang="zh-CN" dirty="0"/>
+              <a:t>2014</a:t>
+            </a:r>
+            <a:r>
+              <a:rPr lang="zh-CN" altLang="en-US" dirty="0"/>
+              <a:t>年提出（</a:t>
+            </a:r>
+            <a:r>
+              <a:rPr lang="en-US" altLang="zh-CN" dirty="0"/>
+              <a:t>PLDI</a:t>
+            </a:r>
+            <a:r>
+              <a:rPr lang="zh-CN" altLang="en-US" dirty="0"/>
+              <a:t>）</a:t>
+            </a:r>
+            <a:endParaRPr lang="en-US" altLang="zh-CN" dirty="0"/>
+          </a:p>
+          <a:p>
+            <a:r>
+              <a:rPr lang="en-US" altLang="zh-CN" dirty="0"/>
+              <a:t>2015</a:t>
+            </a:r>
+            <a:r>
+              <a:rPr lang="zh-CN" altLang="en-US" dirty="0"/>
+              <a:t>年对卫生宏语法糖进行特殊处理（</a:t>
+            </a:r>
+            <a:r>
+              <a:rPr lang="en-US" altLang="zh-CN" dirty="0"/>
+              <a:t>ICFP</a:t>
+            </a:r>
+            <a:r>
+              <a:rPr lang="zh-CN" altLang="en-US" dirty="0"/>
+              <a:t>）</a:t>
+            </a:r>
+            <a:endParaRPr lang="en-US" altLang="zh-CN" dirty="0"/>
+          </a:p>
+          <a:p>
+            <a:endParaRPr lang="en-US" altLang="zh-CN" dirty="0"/>
+          </a:p>
+          <a:p>
+            <a:r>
+              <a:rPr lang="zh-CN" altLang="en-US" dirty="0"/>
+              <a:t>给定语法糖表达式（定义为</a:t>
+            </a:r>
+            <a:r>
+              <a:rPr lang="en-US" altLang="zh-CN" dirty="0"/>
+              <a:t>Surface Language</a:t>
+            </a:r>
+            <a:r>
+              <a:rPr lang="zh-CN" altLang="en-US" dirty="0"/>
+              <a:t>）</a:t>
+            </a:r>
+            <a:endParaRPr lang="en-US" altLang="zh-CN" dirty="0"/>
+          </a:p>
+          <a:p>
+            <a:r>
+              <a:rPr lang="zh-CN" altLang="en-US" dirty="0"/>
+              <a:t>和其在内部语言（定义为</a:t>
+            </a:r>
+            <a:r>
+              <a:rPr lang="en-US" altLang="zh-CN" dirty="0"/>
+              <a:t>Core Language</a:t>
+            </a:r>
+            <a:r>
+              <a:rPr lang="zh-CN" altLang="en-US" dirty="0"/>
+              <a:t>）的求值序列</a:t>
+            </a:r>
+            <a:endParaRPr lang="en-US" altLang="zh-CN" dirty="0"/>
+          </a:p>
+          <a:p>
+            <a:r>
+              <a:rPr lang="zh-CN" altLang="en-US" dirty="0"/>
+              <a:t>得到其在</a:t>
+            </a:r>
+            <a:r>
+              <a:rPr lang="en-US" altLang="zh-CN" dirty="0"/>
+              <a:t>Surface Language</a:t>
+            </a:r>
+            <a:r>
+              <a:rPr lang="zh-CN" altLang="en-US" dirty="0"/>
+              <a:t>上的求值序列</a:t>
+            </a:r>
+            <a:endParaRPr lang="en-US" altLang="zh-CN" dirty="0"/>
+          </a:p>
+          <a:p>
+            <a:endParaRPr lang="en-US" altLang="zh-CN" dirty="0"/>
+          </a:p>
+          <a:p>
+            <a:endParaRPr lang="zh-CN" altLang="en-US" dirty="0"/>
+          </a:p>
+        </p:txBody>
+      </p:sp>
+    </p:spTree>
+    <p:extLst>
+      <p:ext uri="{BB962C8B-B14F-4D97-AF65-F5344CB8AC3E}">
+        <p14:creationId xmlns:p14="http://schemas.microsoft.com/office/powerpoint/2010/main" val="3874586734"/>
+      </p:ext>
+    </p:extLst>
+  </p:cSld>
+  <p:clrMapOvr>
+    <a:masterClrMapping/>
+  </p:clrMapOvr>
+</p:sld>
+</file>
+
+<file path=ppt/slides/slide12.xml><?xml version="1.0" encoding="utf-8"?>
+<p:sld xmlns:a="http://schemas.openxmlformats.org/drawingml/2006/main" xmlns:r="http://schemas.openxmlformats.org/officeDocument/2006/relationships" xmlns:p="http://schemas.openxmlformats.org/presentationml/2006/main">
+  <p:cSld>
+    <p:spTree>
+      <p:nvGrpSpPr>
+        <p:cNvPr id="1" name=""/>
+        <p:cNvGrpSpPr/>
+        <p:nvPr/>
+      </p:nvGrpSpPr>
+      <p:grpSpPr>
+        <a:xfrm>
+          <a:off x="0" y="0"/>
+          <a:ext cx="0" cy="0"/>
+          <a:chOff x="0" y="0"/>
+          <a:chExt cx="0" cy="0"/>
+        </a:xfrm>
+      </p:grpSpPr>
+      <p:sp>
+        <p:nvSpPr>
+          <p:cNvPr id="2" name="标题 1">
+            <a:extLst>
+              <a:ext uri="{FF2B5EF4-FFF2-40B4-BE49-F238E27FC236}">
                 <a16:creationId xmlns:a16="http://schemas.microsoft.com/office/drawing/2014/main" id="{60B72810-57A1-41B5-9278-E85183C40C50}"/>
               </a:ext>
             </a:extLst>
@@ -4198,106 +4391,6 @@
 </p:sld>
 </file>
 
-<file path=ppt/slides/slide12.xml><?xml version="1.0" encoding="utf-8"?>
-<p:sld xmlns:a="http://schemas.openxmlformats.org/drawingml/2006/main" xmlns:r="http://schemas.openxmlformats.org/officeDocument/2006/relationships" xmlns:p="http://schemas.openxmlformats.org/presentationml/2006/main">
-  <p:cSld>
-    <p:spTree>
-      <p:nvGrpSpPr>
-        <p:cNvPr id="1" name=""/>
-        <p:cNvGrpSpPr/>
-        <p:nvPr/>
-      </p:nvGrpSpPr>
-      <p:grpSpPr>
-        <a:xfrm>
-          <a:off x="0" y="0"/>
-          <a:ext cx="0" cy="0"/>
-          <a:chOff x="0" y="0"/>
-          <a:chExt cx="0" cy="0"/>
-        </a:xfrm>
-      </p:grpSpPr>
-      <p:sp>
-        <p:nvSpPr>
-          <p:cNvPr id="2" name="标题 1">
-            <a:extLst>
-              <a:ext uri="{FF2B5EF4-FFF2-40B4-BE49-F238E27FC236}">
-                <a16:creationId xmlns:a16="http://schemas.microsoft.com/office/drawing/2014/main" id="{C69B2021-75B9-42BC-B933-9B5DDDD001AD}"/>
-              </a:ext>
-            </a:extLst>
-          </p:cNvPr>
-          <p:cNvSpPr>
-            <a:spLocks noGrp="1"/>
-          </p:cNvSpPr>
-          <p:nvPr>
-            <p:ph type="title"/>
-          </p:nvPr>
-        </p:nvSpPr>
-        <p:spPr/>
-        <p:txBody>
-          <a:bodyPr/>
-          <a:lstStyle/>
-          <a:p>
-            <a:r>
-              <a:rPr lang="zh-CN" altLang="en-US" dirty="0"/>
-              <a:t>现有工作的问题</a:t>
-            </a:r>
-          </a:p>
-        </p:txBody>
-      </p:sp>
-      <p:sp>
-        <p:nvSpPr>
-          <p:cNvPr id="3" name="内容占位符 2">
-            <a:extLst>
-              <a:ext uri="{FF2B5EF4-FFF2-40B4-BE49-F238E27FC236}">
-                <a16:creationId xmlns:a16="http://schemas.microsoft.com/office/drawing/2014/main" id="{CA5FDAC0-B034-42D3-81B0-15FFC95AC57F}"/>
-              </a:ext>
-            </a:extLst>
-          </p:cNvPr>
-          <p:cNvSpPr>
-            <a:spLocks noGrp="1"/>
-          </p:cNvSpPr>
-          <p:nvPr>
-            <p:ph idx="1"/>
-          </p:nvPr>
-        </p:nvSpPr>
-        <p:spPr/>
-        <p:txBody>
-          <a:bodyPr/>
-          <a:lstStyle/>
-          <a:p>
-            <a:r>
-              <a:rPr lang="zh-CN" altLang="en-US" dirty="0"/>
-              <a:t>算法复杂，对每个表达式都需要进行搜索匹配。</a:t>
-            </a:r>
-            <a:endParaRPr lang="en-US" altLang="zh-CN" dirty="0"/>
-          </a:p>
-          <a:p>
-            <a:r>
-              <a:rPr lang="zh-CN" altLang="en-US" dirty="0"/>
-              <a:t>对卫生宏的处理引入比抽象语法树更复杂的数据结构。</a:t>
-            </a:r>
-            <a:endParaRPr lang="en-US" altLang="zh-CN" dirty="0"/>
-          </a:p>
-          <a:p>
-            <a:r>
-              <a:rPr lang="zh-CN" altLang="en-US" dirty="0"/>
-              <a:t>对递归语法糖处理能力不足。</a:t>
-            </a:r>
-          </a:p>
-        </p:txBody>
-      </p:sp>
-    </p:spTree>
-    <p:extLst>
-      <p:ext uri="{BB962C8B-B14F-4D97-AF65-F5344CB8AC3E}">
-        <p14:creationId xmlns:p14="http://schemas.microsoft.com/office/powerpoint/2010/main" val="3878707497"/>
-      </p:ext>
-    </p:extLst>
-  </p:cSld>
-  <p:clrMapOvr>
-    <a:masterClrMapping/>
-  </p:clrMapOvr>
-</p:sld>
-</file>
-
 <file path=ppt/slides/slide13.xml><?xml version="1.0" encoding="utf-8"?>
 <p:sld xmlns:a="http://schemas.openxmlformats.org/drawingml/2006/main" xmlns:r="http://schemas.openxmlformats.org/officeDocument/2006/relationships" xmlns:p="http://schemas.openxmlformats.org/presentationml/2006/main">
   <p:cSld>
@@ -4320,7 +4413,7 @@
           <p:cNvPr id="2" name="标题 1">
             <a:extLst>
               <a:ext uri="{FF2B5EF4-FFF2-40B4-BE49-F238E27FC236}">
-                <a16:creationId xmlns:a16="http://schemas.microsoft.com/office/drawing/2014/main" id="{0B67B3A8-BC06-498F-9001-395D5D6EEB03}"/>
+                <a16:creationId xmlns:a16="http://schemas.microsoft.com/office/drawing/2014/main" id="{C69B2021-75B9-42BC-B933-9B5DDDD001AD}"/>
               </a:ext>
             </a:extLst>
           </p:cNvPr>
@@ -4338,7 +4431,7 @@
           <a:p>
             <a:r>
               <a:rPr lang="zh-CN" altLang="en-US" dirty="0"/>
-              <a:t>我们的工作</a:t>
+              <a:t>现有工作的问题</a:t>
             </a:r>
           </a:p>
         </p:txBody>
@@ -4348,7 +4441,7 @@
           <p:cNvPr id="3" name="内容占位符 2">
             <a:extLst>
               <a:ext uri="{FF2B5EF4-FFF2-40B4-BE49-F238E27FC236}">
-                <a16:creationId xmlns:a16="http://schemas.microsoft.com/office/drawing/2014/main" id="{B2C580D6-AC3C-4D57-9368-27095569CA30}"/>
+                <a16:creationId xmlns:a16="http://schemas.microsoft.com/office/drawing/2014/main" id="{CA5FDAC0-B034-42D3-81B0-15FFC95AC57F}"/>
               </a:ext>
             </a:extLst>
           </p:cNvPr>
@@ -4366,66 +4459,29 @@
           <a:p>
             <a:r>
               <a:rPr lang="zh-CN" altLang="en-US" dirty="0"/>
-              <a:t>基于</a:t>
-            </a:r>
-            <a:r>
-              <a:rPr lang="en-US" altLang="zh-CN" dirty="0" err="1"/>
-              <a:t>Redex</a:t>
-            </a:r>
+              <a:t>算法复杂，对每个表达式都需要进行搜索匹配。</a:t>
+            </a:r>
+            <a:endParaRPr lang="en-US" altLang="zh-CN" dirty="0"/>
+          </a:p>
+          <a:p>
             <a:r>
               <a:rPr lang="zh-CN" altLang="en-US" dirty="0"/>
-              <a:t>实现了一个轻量级重组糖算法。</a:t>
+              <a:t>对卫生宏的处理引入比抽象语法树更复杂的数据结构。</a:t>
             </a:r>
             <a:endParaRPr lang="en-US" altLang="zh-CN" dirty="0"/>
           </a:p>
           <a:p>
             <a:r>
               <a:rPr lang="zh-CN" altLang="en-US" dirty="0"/>
-              <a:t>相较于现有工作</a:t>
-            </a:r>
-            <a:endParaRPr lang="en-US" altLang="zh-CN" dirty="0"/>
-          </a:p>
-          <a:p>
-            <a:pPr lvl="1"/>
-            <a:r>
-              <a:rPr lang="zh-CN" altLang="en-US" dirty="0"/>
-              <a:t>简单自然的处理卫生宏。</a:t>
-            </a:r>
-            <a:endParaRPr lang="en-US" altLang="zh-CN" dirty="0"/>
-          </a:p>
-          <a:p>
-            <a:pPr lvl="1"/>
-            <a:r>
-              <a:rPr lang="zh-CN" altLang="en-US" dirty="0"/>
-              <a:t>能处理递归语法糖、高阶糖。</a:t>
-            </a:r>
-            <a:endParaRPr lang="en-US" altLang="zh-CN" dirty="0"/>
-          </a:p>
-          <a:p>
-            <a:pPr lvl="1"/>
-            <a:r>
-              <a:rPr lang="zh-CN" altLang="en-US" dirty="0"/>
-              <a:t>算法更加简单。</a:t>
-            </a:r>
-            <a:endParaRPr lang="en-US" altLang="zh-CN" dirty="0"/>
-          </a:p>
-          <a:p>
-            <a:r>
-              <a:rPr lang="zh-CN" altLang="en-US" dirty="0"/>
-              <a:t>且满足仿真性、抽象性、覆盖性</a:t>
-            </a:r>
-            <a:endParaRPr lang="en-US" altLang="zh-CN" dirty="0"/>
-          </a:p>
-          <a:p>
-            <a:pPr lvl="1"/>
-            <a:endParaRPr lang="zh-CN" altLang="en-US" dirty="0"/>
+              <a:t>对递归语法糖、高阶语法糖处理能力不足。</a:t>
+            </a:r>
           </a:p>
         </p:txBody>
       </p:sp>
     </p:spTree>
     <p:extLst>
       <p:ext uri="{BB962C8B-B14F-4D97-AF65-F5344CB8AC3E}">
-        <p14:creationId xmlns:p14="http://schemas.microsoft.com/office/powerpoint/2010/main" val="614383595"/>
+        <p14:creationId xmlns:p14="http://schemas.microsoft.com/office/powerpoint/2010/main" val="3878707497"/>
       </p:ext>
     </p:extLst>
   </p:cSld>
@@ -4457,7 +4513,7 @@
           <p:cNvPr id="2" name="标题 1">
             <a:extLst>
               <a:ext uri="{FF2B5EF4-FFF2-40B4-BE49-F238E27FC236}">
-                <a16:creationId xmlns:a16="http://schemas.microsoft.com/office/drawing/2014/main" id="{24705DBC-8514-4CE4-A811-E1DC2F3677F8}"/>
+                <a16:creationId xmlns:a16="http://schemas.microsoft.com/office/drawing/2014/main" id="{0B67B3A8-BC06-498F-9001-395D5D6EEB03}"/>
               </a:ext>
             </a:extLst>
           </p:cNvPr>
@@ -4475,50 +4531,99 @@
           <a:p>
             <a:r>
               <a:rPr lang="zh-CN" altLang="en-US" dirty="0"/>
-              <a:t>基本思路</a:t>
-            </a:r>
-          </a:p>
-        </p:txBody>
-      </p:sp>
-      <p:pic>
-        <p:nvPicPr>
-          <p:cNvPr id="5" name="内容占位符 4">
-            <a:extLst>
-              <a:ext uri="{FF2B5EF4-FFF2-40B4-BE49-F238E27FC236}">
-                <a16:creationId xmlns:a16="http://schemas.microsoft.com/office/drawing/2014/main" id="{D8FD94B0-B975-4A4D-84A1-F9DCDC746965}"/>
-              </a:ext>
-            </a:extLst>
-          </p:cNvPr>
-          <p:cNvPicPr>
-            <a:picLocks noGrp="1" noChangeAspect="1"/>
-          </p:cNvPicPr>
+              <a:t>我们的工作</a:t>
+            </a:r>
+          </a:p>
+        </p:txBody>
+      </p:sp>
+      <p:sp>
+        <p:nvSpPr>
+          <p:cNvPr id="3" name="内容占位符 2">
+            <a:extLst>
+              <a:ext uri="{FF2B5EF4-FFF2-40B4-BE49-F238E27FC236}">
+                <a16:creationId xmlns:a16="http://schemas.microsoft.com/office/drawing/2014/main" id="{B2C580D6-AC3C-4D57-9368-27095569CA30}"/>
+              </a:ext>
+            </a:extLst>
+          </p:cNvPr>
+          <p:cNvSpPr>
+            <a:spLocks noGrp="1"/>
+          </p:cNvSpPr>
           <p:nvPr>
             <p:ph idx="1"/>
           </p:nvPr>
-        </p:nvPicPr>
-        <p:blipFill>
-          <a:blip r:embed="rId2">
-            <a:extLst>
-              <a:ext uri="{28A0092B-C50C-407E-A947-70E740481C1C}">
-                <a14:useLocalDpi xmlns:a14="http://schemas.microsoft.com/office/drawing/2010/main" val="0"/>
-              </a:ext>
-            </a:extLst>
-          </a:blip>
-          <a:stretch>
-            <a:fillRect/>
-          </a:stretch>
-        </p:blipFill>
-        <p:spPr>
-          <a:xfrm>
-            <a:off x="838200" y="2041659"/>
-            <a:ext cx="10515600" cy="3919269"/>
-          </a:xfrm>
-        </p:spPr>
-      </p:pic>
+        </p:nvSpPr>
+        <p:spPr/>
+        <p:txBody>
+          <a:bodyPr/>
+          <a:lstStyle/>
+          <a:p>
+            <a:r>
+              <a:rPr lang="zh-CN" altLang="en-US" dirty="0"/>
+              <a:t>设计了一个轻量级重组糖算法。相较于现有工作</a:t>
+            </a:r>
+            <a:endParaRPr lang="en-US" altLang="zh-CN" dirty="0"/>
+          </a:p>
+          <a:p>
+            <a:pPr lvl="1"/>
+            <a:r>
+              <a:rPr lang="zh-CN" altLang="en-US" dirty="0"/>
+              <a:t>简单自然的处理卫生宏。</a:t>
+            </a:r>
+            <a:endParaRPr lang="en-US" altLang="zh-CN" dirty="0"/>
+          </a:p>
+          <a:p>
+            <a:pPr lvl="1"/>
+            <a:r>
+              <a:rPr lang="zh-CN" altLang="en-US" dirty="0"/>
+              <a:t>能处理递归语法糖、高阶糖。</a:t>
+            </a:r>
+            <a:endParaRPr lang="en-US" altLang="zh-CN" dirty="0"/>
+          </a:p>
+          <a:p>
+            <a:pPr lvl="1"/>
+            <a:r>
+              <a:rPr lang="zh-CN" altLang="en-US" dirty="0"/>
+              <a:t>算法更加简单。</a:t>
+            </a:r>
+            <a:endParaRPr lang="en-US" altLang="zh-CN" dirty="0"/>
+          </a:p>
+          <a:p>
+            <a:pPr lvl="1"/>
+            <a:r>
+              <a:rPr lang="zh-CN" altLang="en-US" dirty="0"/>
+              <a:t>且满足仿真性、抽象性、覆盖性。</a:t>
+            </a:r>
+            <a:endParaRPr lang="en-US" altLang="zh-CN" dirty="0"/>
+          </a:p>
+          <a:p>
+            <a:r>
+              <a:rPr lang="zh-CN" altLang="en-US" dirty="0"/>
+              <a:t>基于</a:t>
+            </a:r>
+            <a:r>
+              <a:rPr lang="en-US" altLang="zh-CN" dirty="0"/>
+              <a:t>PLT </a:t>
+            </a:r>
+            <a:r>
+              <a:rPr lang="en-US" altLang="zh-CN" dirty="0" err="1"/>
+              <a:t>Redex</a:t>
+            </a:r>
+            <a:r>
+              <a:rPr lang="zh-CN" altLang="en-US" dirty="0"/>
+              <a:t>实现了工具，并在一些例子上进行验证。</a:t>
+            </a:r>
+            <a:endParaRPr lang="en-US" altLang="zh-CN" dirty="0"/>
+          </a:p>
+          <a:p>
+            <a:pPr lvl="1"/>
+            <a:endParaRPr lang="zh-CN" altLang="en-US" dirty="0"/>
+          </a:p>
+        </p:txBody>
+      </p:sp>
     </p:spTree>
     <p:extLst>
       <p:ext uri="{BB962C8B-B14F-4D97-AF65-F5344CB8AC3E}">
-        <p14:creationId xmlns:p14="http://schemas.microsoft.com/office/powerpoint/2010/main" val="1560220071"/>
+        <p14:creationId xmlns:p14="http://schemas.microsoft.com/office/powerpoint/2010/main" val="614383595"/>
       </p:ext>
     </p:extLst>
   </p:cSld>
@@ -4550,7 +4655,7 @@
           <p:cNvPr id="2" name="标题 1">
             <a:extLst>
               <a:ext uri="{FF2B5EF4-FFF2-40B4-BE49-F238E27FC236}">
-                <a16:creationId xmlns:a16="http://schemas.microsoft.com/office/drawing/2014/main" id="{8EAB8E74-FDE5-4A8B-B57C-00EF2D365CC8}"/>
+                <a16:creationId xmlns:a16="http://schemas.microsoft.com/office/drawing/2014/main" id="{24705DBC-8514-4CE4-A811-E1DC2F3677F8}"/>
               </a:ext>
             </a:extLst>
           </p:cNvPr>
@@ -4568,17 +4673,82 @@
           <a:p>
             <a:r>
               <a:rPr lang="zh-CN" altLang="en-US" dirty="0"/>
-              <a:t>初步思想</a:t>
-            </a:r>
-          </a:p>
-        </p:txBody>
-      </p:sp>
-      <p:sp>
-        <p:nvSpPr>
-          <p:cNvPr id="3" name="内容占位符 2">
-            <a:extLst>
-              <a:ext uri="{FF2B5EF4-FFF2-40B4-BE49-F238E27FC236}">
-                <a16:creationId xmlns:a16="http://schemas.microsoft.com/office/drawing/2014/main" id="{CC294F4C-D752-479C-B982-6B67E0ED04D3}"/>
+              <a:t>基本思路</a:t>
+            </a:r>
+          </a:p>
+        </p:txBody>
+      </p:sp>
+      <p:pic>
+        <p:nvPicPr>
+          <p:cNvPr id="5" name="内容占位符 4">
+            <a:extLst>
+              <a:ext uri="{FF2B5EF4-FFF2-40B4-BE49-F238E27FC236}">
+                <a16:creationId xmlns:a16="http://schemas.microsoft.com/office/drawing/2014/main" id="{D8FD94B0-B975-4A4D-84A1-F9DCDC746965}"/>
+              </a:ext>
+            </a:extLst>
+          </p:cNvPr>
+          <p:cNvPicPr>
+            <a:picLocks noGrp="1" noChangeAspect="1"/>
+          </p:cNvPicPr>
+          <p:nvPr>
+            <p:ph idx="1"/>
+          </p:nvPr>
+        </p:nvPicPr>
+        <p:blipFill>
+          <a:blip r:embed="rId2">
+            <a:extLst>
+              <a:ext uri="{28A0092B-C50C-407E-A947-70E740481C1C}">
+                <a14:useLocalDpi xmlns:a14="http://schemas.microsoft.com/office/drawing/2010/main" val="0"/>
+              </a:ext>
+            </a:extLst>
+          </a:blip>
+          <a:stretch>
+            <a:fillRect/>
+          </a:stretch>
+        </p:blipFill>
+        <p:spPr>
+          <a:xfrm>
+            <a:off x="838200" y="2041659"/>
+            <a:ext cx="10515600" cy="3919269"/>
+          </a:xfrm>
+        </p:spPr>
+      </p:pic>
+    </p:spTree>
+    <p:extLst>
+      <p:ext uri="{BB962C8B-B14F-4D97-AF65-F5344CB8AC3E}">
+        <p14:creationId xmlns:p14="http://schemas.microsoft.com/office/powerpoint/2010/main" val="1560220071"/>
+      </p:ext>
+    </p:extLst>
+  </p:cSld>
+  <p:clrMapOvr>
+    <a:masterClrMapping/>
+  </p:clrMapOvr>
+</p:sld>
+</file>
+
+<file path=ppt/slides/slide16.xml><?xml version="1.0" encoding="utf-8"?>
+<p:sld xmlns:a="http://schemas.openxmlformats.org/drawingml/2006/main" xmlns:r="http://schemas.openxmlformats.org/officeDocument/2006/relationships" xmlns:p="http://schemas.openxmlformats.org/presentationml/2006/main">
+  <p:cSld>
+    <p:spTree>
+      <p:nvGrpSpPr>
+        <p:cNvPr id="1" name=""/>
+        <p:cNvGrpSpPr/>
+        <p:nvPr/>
+      </p:nvGrpSpPr>
+      <p:grpSpPr>
+        <a:xfrm>
+          <a:off x="0" y="0"/>
+          <a:ext cx="0" cy="0"/>
+          <a:chOff x="0" y="0"/>
+          <a:chExt cx="0" cy="0"/>
+        </a:xfrm>
+      </p:grpSpPr>
+      <p:sp>
+        <p:nvSpPr>
+          <p:cNvPr id="2" name="标题 1">
+            <a:extLst>
+              <a:ext uri="{FF2B5EF4-FFF2-40B4-BE49-F238E27FC236}">
+                <a16:creationId xmlns:a16="http://schemas.microsoft.com/office/drawing/2014/main" id="{8EAB8E74-FDE5-4A8B-B57C-00EF2D365CC8}"/>
               </a:ext>
             </a:extLst>
           </p:cNvPr>
@@ -4586,6 +4756,34 @@
             <a:spLocks noGrp="1"/>
           </p:cNvSpPr>
           <p:nvPr>
+            <p:ph type="title"/>
+          </p:nvPr>
+        </p:nvSpPr>
+        <p:spPr/>
+        <p:txBody>
+          <a:bodyPr/>
+          <a:lstStyle/>
+          <a:p>
+            <a:r>
+              <a:rPr lang="zh-CN" altLang="en-US" dirty="0"/>
+              <a:t>初步思想</a:t>
+            </a:r>
+          </a:p>
+        </p:txBody>
+      </p:sp>
+      <p:sp>
+        <p:nvSpPr>
+          <p:cNvPr id="3" name="内容占位符 2">
+            <a:extLst>
+              <a:ext uri="{FF2B5EF4-FFF2-40B4-BE49-F238E27FC236}">
+                <a16:creationId xmlns:a16="http://schemas.microsoft.com/office/drawing/2014/main" id="{CC294F4C-D752-479C-B982-6B67E0ED04D3}"/>
+              </a:ext>
+            </a:extLst>
+          </p:cNvPr>
+          <p:cNvSpPr>
+            <a:spLocks noGrp="1"/>
+          </p:cNvSpPr>
+          <p:nvPr>
             <p:ph idx="1"/>
           </p:nvPr>
         </p:nvSpPr>
@@ -4596,9 +4794,22 @@
           <a:p>
             <a:r>
               <a:rPr lang="zh-CN" altLang="en-US" dirty="0"/>
-              <a:t>语法糖不需要完全展开，就可以得到重组糖序列</a:t>
+              <a:t>语法糖不需要完全展开，就可以得到重组糖序列。</a:t>
             </a:r>
             <a:endParaRPr lang="en-US" altLang="zh-CN" dirty="0"/>
+          </a:p>
+          <a:p>
+            <a:r>
+              <a:rPr lang="zh-CN" altLang="en-US" b="1" dirty="0"/>
+              <a:t>语法糖只需要在不得不展开时再展开</a:t>
+            </a:r>
+            <a:endParaRPr lang="en-US" altLang="zh-CN" b="1" dirty="0"/>
+          </a:p>
+          <a:p>
+            <a:endParaRPr lang="en-US" altLang="zh-CN" b="1" dirty="0"/>
+          </a:p>
+          <a:p>
+            <a:endParaRPr lang="en-US" altLang="zh-CN" b="1" dirty="0"/>
           </a:p>
           <a:p>
             <a:r>
@@ -4645,7 +4856,7 @@
 </p:sld>
 </file>
 
-<file path=ppt/slides/slide16.xml><?xml version="1.0" encoding="utf-8"?>
+<file path=ppt/slides/slide17.xml><?xml version="1.0" encoding="utf-8"?>
 <p:sld xmlns:a="http://schemas.openxmlformats.org/drawingml/2006/main" xmlns:r="http://schemas.openxmlformats.org/officeDocument/2006/relationships" xmlns:p="http://schemas.openxmlformats.org/presentationml/2006/main">
   <p:cSld>
     <p:spTree>
@@ -5071,7 +5282,7 @@
 </p:sld>
 </file>
 
-<file path=ppt/slides/slide17.xml><?xml version="1.0" encoding="utf-8"?>
+<file path=ppt/slides/slide18.xml><?xml version="1.0" encoding="utf-8"?>
 <p:sld xmlns:a="http://schemas.openxmlformats.org/drawingml/2006/main" xmlns:r="http://schemas.openxmlformats.org/officeDocument/2006/relationships" xmlns:p="http://schemas.openxmlformats.org/presentationml/2006/main">
   <p:cSld>
     <p:spTree>
@@ -5154,7 +5365,7 @@
 </p:sld>
 </file>
 
-<file path=ppt/slides/slide18.xml><?xml version="1.0" encoding="utf-8"?>
+<file path=ppt/slides/slide19.xml><?xml version="1.0" encoding="utf-8"?>
 <p:sld xmlns:a="http://schemas.openxmlformats.org/drawingml/2006/main" xmlns:r="http://schemas.openxmlformats.org/officeDocument/2006/relationships" xmlns:p="http://schemas.openxmlformats.org/presentationml/2006/main">
   <p:cSld>
     <p:spTree>
@@ -5375,443 +5586,6 @@
     <p:extLst>
       <p:ext uri="{BB962C8B-B14F-4D97-AF65-F5344CB8AC3E}">
         <p14:creationId xmlns:p14="http://schemas.microsoft.com/office/powerpoint/2010/main" val="250769752"/>
-      </p:ext>
-    </p:extLst>
-  </p:cSld>
-  <p:clrMapOvr>
-    <a:masterClrMapping/>
-  </p:clrMapOvr>
-</p:sld>
-</file>
-
-<file path=ppt/slides/slide19.xml><?xml version="1.0" encoding="utf-8"?>
-<p:sld xmlns:a="http://schemas.openxmlformats.org/drawingml/2006/main" xmlns:r="http://schemas.openxmlformats.org/officeDocument/2006/relationships" xmlns:p="http://schemas.openxmlformats.org/presentationml/2006/main">
-  <p:cSld>
-    <p:spTree>
-      <p:nvGrpSpPr>
-        <p:cNvPr id="1" name=""/>
-        <p:cNvGrpSpPr/>
-        <p:nvPr/>
-      </p:nvGrpSpPr>
-      <p:grpSpPr>
-        <a:xfrm>
-          <a:off x="0" y="0"/>
-          <a:ext cx="0" cy="0"/>
-          <a:chOff x="0" y="0"/>
-          <a:chExt cx="0" cy="0"/>
-        </a:xfrm>
-      </p:grpSpPr>
-      <p:sp>
-        <p:nvSpPr>
-          <p:cNvPr id="2" name="标题 1">
-            <a:extLst>
-              <a:ext uri="{FF2B5EF4-FFF2-40B4-BE49-F238E27FC236}">
-                <a16:creationId xmlns:a16="http://schemas.microsoft.com/office/drawing/2014/main" id="{A18EA3A3-240C-42DF-8B01-17CA3AEFFC5E}"/>
-              </a:ext>
-            </a:extLst>
-          </p:cNvPr>
-          <p:cNvSpPr>
-            <a:spLocks noGrp="1"/>
-          </p:cNvSpPr>
-          <p:nvPr>
-            <p:ph type="title"/>
-          </p:nvPr>
-        </p:nvSpPr>
-        <p:spPr/>
-        <p:txBody>
-          <a:bodyPr/>
-          <a:lstStyle/>
-          <a:p>
-            <a:r>
-              <a:rPr lang="zh-CN" altLang="en-US" dirty="0"/>
-              <a:t>卫生宏</a:t>
-            </a:r>
-          </a:p>
-        </p:txBody>
-      </p:sp>
-      <p:sp>
-        <p:nvSpPr>
-          <p:cNvPr id="3" name="内容占位符 2">
-            <a:extLst>
-              <a:ext uri="{FF2B5EF4-FFF2-40B4-BE49-F238E27FC236}">
-                <a16:creationId xmlns:a16="http://schemas.microsoft.com/office/drawing/2014/main" id="{7E812C04-0B88-424A-8943-D63970D4B5AA}"/>
-              </a:ext>
-            </a:extLst>
-          </p:cNvPr>
-          <p:cNvSpPr>
-            <a:spLocks noGrp="1"/>
-          </p:cNvSpPr>
-          <p:nvPr>
-            <p:ph idx="1"/>
-          </p:nvPr>
-        </p:nvSpPr>
-        <p:spPr/>
-        <p:txBody>
-          <a:bodyPr/>
-          <a:lstStyle/>
-          <a:p>
-            <a:r>
-              <a:rPr lang="en-US" altLang="zh-CN" dirty="0"/>
-              <a:t>(Let x 2 (Let x 1 (+ x 1)))</a:t>
-            </a:r>
-          </a:p>
-          <a:p>
-            <a:r>
-              <a:rPr lang="en-US" altLang="zh-CN" dirty="0"/>
-              <a:t>                            ↑</a:t>
-            </a:r>
-          </a:p>
-          <a:p>
-            <a:r>
-              <a:rPr lang="en-US" altLang="zh-CN" dirty="0"/>
-              <a:t>           </a:t>
-            </a:r>
-            <a:r>
-              <a:rPr lang="zh-CN" altLang="en-US" dirty="0"/>
-              <a:t>此处</a:t>
-            </a:r>
-            <a:r>
-              <a:rPr lang="en-US" altLang="zh-CN" dirty="0"/>
-              <a:t>x</a:t>
-            </a:r>
-            <a:r>
-              <a:rPr lang="zh-CN" altLang="en-US" dirty="0"/>
-              <a:t>是</a:t>
-            </a:r>
-            <a:r>
-              <a:rPr lang="en-US" altLang="zh-CN" dirty="0"/>
-              <a:t>1</a:t>
-            </a:r>
-            <a:r>
-              <a:rPr lang="zh-CN" altLang="en-US" dirty="0"/>
-              <a:t>而不是</a:t>
-            </a:r>
-            <a:r>
-              <a:rPr lang="en-US" altLang="zh-CN" dirty="0"/>
-              <a:t>2</a:t>
-            </a:r>
-          </a:p>
-          <a:p>
-            <a:endParaRPr lang="en-US" altLang="zh-CN" dirty="0"/>
-          </a:p>
-          <a:p>
-            <a:r>
-              <a:rPr lang="zh-CN" altLang="en-US" dirty="0"/>
-              <a:t>算法没有对卫生宏特殊处理</a:t>
-            </a:r>
-            <a:endParaRPr lang="en-US" altLang="zh-CN" dirty="0"/>
-          </a:p>
-          <a:p>
-            <a:r>
-              <a:rPr lang="zh-CN" altLang="en-US" dirty="0"/>
-              <a:t>但依然可以解决卫生宏重组糖</a:t>
-            </a:r>
-          </a:p>
-        </p:txBody>
-      </p:sp>
-      <p:sp>
-        <p:nvSpPr>
-          <p:cNvPr id="5" name="矩形: 圆角 4">
-            <a:extLst>
-              <a:ext uri="{FF2B5EF4-FFF2-40B4-BE49-F238E27FC236}">
-                <a16:creationId xmlns:a16="http://schemas.microsoft.com/office/drawing/2014/main" id="{DA2E40B9-8353-4B3E-96FB-13415822F110}"/>
-              </a:ext>
-            </a:extLst>
-          </p:cNvPr>
-          <p:cNvSpPr/>
-          <p:nvPr/>
-        </p:nvSpPr>
-        <p:spPr>
-          <a:xfrm>
-            <a:off x="6096000" y="670243"/>
-            <a:ext cx="4998720" cy="5506720"/>
-          </a:xfrm>
-          <a:prstGeom prst="roundRect">
-            <a:avLst/>
-          </a:prstGeom>
-          <a:solidFill>
-            <a:schemeClr val="bg1"/>
-          </a:solidFill>
-        </p:spPr>
-        <p:style>
-          <a:lnRef idx="2">
-            <a:schemeClr val="accent1">
-              <a:shade val="50000"/>
-            </a:schemeClr>
-          </a:lnRef>
-          <a:fillRef idx="1">
-            <a:schemeClr val="accent1"/>
-          </a:fillRef>
-          <a:effectRef idx="0">
-            <a:schemeClr val="accent1"/>
-          </a:effectRef>
-          <a:fontRef idx="minor">
-            <a:schemeClr val="lt1"/>
-          </a:fontRef>
-        </p:style>
-        <p:txBody>
-          <a:bodyPr rtlCol="0" anchor="ctr"/>
-          <a:lstStyle/>
-          <a:p>
-            <a:pPr algn="ctr"/>
-            <a:r>
-              <a:rPr lang="da-DK" altLang="zh-CN" sz="2000" dirty="0">
-                <a:solidFill>
-                  <a:schemeClr val="tx1"/>
-                </a:solidFill>
-                <a:sym typeface="Wingdings" panose="05000000000000000000" pitchFamily="2" charset="2"/>
-              </a:rPr>
-              <a:t>(Let x (+ 1 2) (+ x (Let x (+ 1 4) (+ x 1))))</a:t>
-            </a:r>
-            <a:endParaRPr lang="en-US" altLang="zh-CN" sz="2000" dirty="0">
-              <a:solidFill>
-                <a:schemeClr val="tx1"/>
-              </a:solidFill>
-              <a:sym typeface="Wingdings" panose="05000000000000000000" pitchFamily="2" charset="2"/>
-            </a:endParaRPr>
-          </a:p>
-          <a:p>
-            <a:pPr algn="ctr"/>
-            <a:r>
-              <a:rPr lang="zh-CN" altLang="en-US" sz="2000" dirty="0">
-                <a:solidFill>
-                  <a:schemeClr val="tx1"/>
-                </a:solidFill>
-              </a:rPr>
-              <a:t>↓</a:t>
-            </a:r>
-            <a:endParaRPr lang="en-US" altLang="zh-CN" sz="2000" dirty="0">
-              <a:solidFill>
-                <a:schemeClr val="tx1"/>
-              </a:solidFill>
-              <a:sym typeface="Wingdings" panose="05000000000000000000" pitchFamily="2" charset="2"/>
-            </a:endParaRPr>
-          </a:p>
-          <a:p>
-            <a:pPr algn="ctr"/>
-            <a:r>
-              <a:rPr lang="da-DK" altLang="zh-CN" sz="2000" dirty="0">
-                <a:solidFill>
-                  <a:schemeClr val="tx1"/>
-                </a:solidFill>
-                <a:sym typeface="Wingdings" panose="05000000000000000000" pitchFamily="2" charset="2"/>
-              </a:rPr>
-              <a:t>(Let x 3 (+ x (Let x (+ 1 4) (+ x 1))))</a:t>
-            </a:r>
-          </a:p>
-          <a:p>
-            <a:pPr algn="ctr"/>
-            <a:r>
-              <a:rPr lang="zh-CN" altLang="en-US" sz="2000" dirty="0">
-                <a:solidFill>
-                  <a:schemeClr val="tx1"/>
-                </a:solidFill>
-              </a:rPr>
-              <a:t>↓</a:t>
-            </a:r>
-            <a:endParaRPr lang="en-US" altLang="zh-CN" sz="2000" dirty="0">
-              <a:solidFill>
-                <a:schemeClr val="tx1"/>
-              </a:solidFill>
-            </a:endParaRPr>
-          </a:p>
-          <a:p>
-            <a:pPr algn="ctr"/>
-            <a:r>
-              <a:rPr lang="da-DK" altLang="zh-CN" sz="2000" dirty="0">
-                <a:solidFill>
-                  <a:schemeClr val="tx1"/>
-                </a:solidFill>
-                <a:sym typeface="Wingdings" panose="05000000000000000000" pitchFamily="2" charset="2"/>
-              </a:rPr>
-              <a:t>((λ (x) (+ x (Let x (+ 1 4) (+ x 1)))) 3)</a:t>
-            </a:r>
-          </a:p>
-          <a:p>
-            <a:pPr algn="ctr"/>
-            <a:r>
-              <a:rPr lang="zh-CN" altLang="en-US" sz="2000" dirty="0">
-                <a:solidFill>
-                  <a:schemeClr val="tx1"/>
-                </a:solidFill>
-              </a:rPr>
-              <a:t>↓</a:t>
-            </a:r>
-            <a:endParaRPr lang="en-US" altLang="zh-CN" sz="2000" dirty="0">
-              <a:solidFill>
-                <a:schemeClr val="tx1"/>
-              </a:solidFill>
-              <a:sym typeface="Wingdings" panose="05000000000000000000" pitchFamily="2" charset="2"/>
-            </a:endParaRPr>
-          </a:p>
-          <a:p>
-            <a:pPr algn="ctr"/>
-            <a:r>
-              <a:rPr lang="da-DK" altLang="zh-CN" sz="2000" dirty="0">
-                <a:solidFill>
-                  <a:schemeClr val="tx1"/>
-                </a:solidFill>
-                <a:sym typeface="Wingdings" panose="05000000000000000000" pitchFamily="2" charset="2"/>
-              </a:rPr>
-              <a:t>(+ 3 (Let x (+ 1 4) (+ x 1)))</a:t>
-            </a:r>
-          </a:p>
-          <a:p>
-            <a:pPr algn="ctr"/>
-            <a:r>
-              <a:rPr lang="zh-CN" altLang="en-US" sz="2000" dirty="0">
-                <a:solidFill>
-                  <a:schemeClr val="tx1"/>
-                </a:solidFill>
-              </a:rPr>
-              <a:t>↓</a:t>
-            </a:r>
-            <a:endParaRPr lang="en-US" altLang="zh-CN" sz="2000" dirty="0">
-              <a:solidFill>
-                <a:schemeClr val="tx1"/>
-              </a:solidFill>
-            </a:endParaRPr>
-          </a:p>
-          <a:p>
-            <a:pPr algn="ctr"/>
-            <a:r>
-              <a:rPr lang="da-DK" altLang="zh-CN" sz="2000" dirty="0">
-                <a:solidFill>
-                  <a:schemeClr val="tx1"/>
-                </a:solidFill>
-                <a:sym typeface="Wingdings" panose="05000000000000000000" pitchFamily="2" charset="2"/>
-              </a:rPr>
-              <a:t>(+ 3 (Let x 5 (+ x 1)))</a:t>
-            </a:r>
-          </a:p>
-          <a:p>
-            <a:pPr algn="ctr"/>
-            <a:r>
-              <a:rPr lang="zh-CN" altLang="en-US" sz="2000" dirty="0">
-                <a:solidFill>
-                  <a:schemeClr val="tx1"/>
-                </a:solidFill>
-              </a:rPr>
-              <a:t>↓</a:t>
-            </a:r>
-            <a:endParaRPr lang="da-DK" altLang="zh-CN" sz="2000" dirty="0">
-              <a:solidFill>
-                <a:schemeClr val="tx1"/>
-              </a:solidFill>
-              <a:sym typeface="Wingdings" panose="05000000000000000000" pitchFamily="2" charset="2"/>
-            </a:endParaRPr>
-          </a:p>
-          <a:p>
-            <a:pPr algn="ctr"/>
-            <a:r>
-              <a:rPr lang="da-DK" altLang="zh-CN" sz="2000" dirty="0">
-                <a:solidFill>
-                  <a:schemeClr val="tx1"/>
-                </a:solidFill>
-                <a:sym typeface="Wingdings" panose="05000000000000000000" pitchFamily="2" charset="2"/>
-              </a:rPr>
-              <a:t>(+ 3 ((λ (x) (+ x 1)) 5))</a:t>
-            </a:r>
-          </a:p>
-          <a:p>
-            <a:pPr algn="ctr"/>
-            <a:r>
-              <a:rPr lang="zh-CN" altLang="en-US" sz="2000" dirty="0">
-                <a:solidFill>
-                  <a:schemeClr val="tx1"/>
-                </a:solidFill>
-              </a:rPr>
-              <a:t>↓</a:t>
-            </a:r>
-            <a:endParaRPr lang="da-DK" altLang="zh-CN" sz="2000" dirty="0">
-              <a:solidFill>
-                <a:schemeClr val="tx1"/>
-              </a:solidFill>
-              <a:sym typeface="Wingdings" panose="05000000000000000000" pitchFamily="2" charset="2"/>
-            </a:endParaRPr>
-          </a:p>
-          <a:p>
-            <a:pPr algn="ctr"/>
-            <a:r>
-              <a:rPr lang="da-DK" altLang="zh-CN" sz="2000" dirty="0">
-                <a:solidFill>
-                  <a:schemeClr val="tx1"/>
-                </a:solidFill>
-                <a:sym typeface="Wingdings" panose="05000000000000000000" pitchFamily="2" charset="2"/>
-              </a:rPr>
-              <a:t>(+ 3 (+ 5 1))</a:t>
-            </a:r>
-          </a:p>
-          <a:p>
-            <a:pPr algn="ctr"/>
-            <a:r>
-              <a:rPr lang="zh-CN" altLang="en-US" sz="2000" dirty="0">
-                <a:solidFill>
-                  <a:schemeClr val="tx1"/>
-                </a:solidFill>
-              </a:rPr>
-              <a:t>↓</a:t>
-            </a:r>
-            <a:endParaRPr lang="da-DK" altLang="zh-CN" sz="2000" dirty="0">
-              <a:solidFill>
-                <a:schemeClr val="tx1"/>
-              </a:solidFill>
-              <a:sym typeface="Wingdings" panose="05000000000000000000" pitchFamily="2" charset="2"/>
-            </a:endParaRPr>
-          </a:p>
-          <a:p>
-            <a:pPr algn="ctr"/>
-            <a:r>
-              <a:rPr lang="da-DK" altLang="zh-CN" sz="2000" dirty="0">
-                <a:solidFill>
-                  <a:schemeClr val="tx1"/>
-                </a:solidFill>
-                <a:sym typeface="Wingdings" panose="05000000000000000000" pitchFamily="2" charset="2"/>
-              </a:rPr>
-              <a:t>(+ 3 6)</a:t>
-            </a:r>
-          </a:p>
-          <a:p>
-            <a:pPr algn="ctr"/>
-            <a:r>
-              <a:rPr lang="zh-CN" altLang="en-US" sz="2000" dirty="0">
-                <a:solidFill>
-                  <a:schemeClr val="tx1"/>
-                </a:solidFill>
-              </a:rPr>
-              <a:t>↓</a:t>
-            </a:r>
-            <a:endParaRPr lang="da-DK" altLang="zh-CN" sz="2000" dirty="0">
-              <a:solidFill>
-                <a:schemeClr val="tx1"/>
-              </a:solidFill>
-              <a:sym typeface="Wingdings" panose="05000000000000000000" pitchFamily="2" charset="2"/>
-            </a:endParaRPr>
-          </a:p>
-          <a:p>
-            <a:pPr algn="ctr"/>
-            <a:r>
-              <a:rPr lang="da-DK" altLang="zh-CN" sz="2000" dirty="0">
-                <a:solidFill>
-                  <a:schemeClr val="tx1"/>
-                </a:solidFill>
-                <a:sym typeface="Wingdings" panose="05000000000000000000" pitchFamily="2" charset="2"/>
-              </a:rPr>
-              <a:t>9</a:t>
-            </a:r>
-            <a:endParaRPr lang="en-US" altLang="zh-CN" sz="2000" dirty="0">
-              <a:solidFill>
-                <a:schemeClr val="tx1"/>
-              </a:solidFill>
-              <a:sym typeface="Wingdings" panose="05000000000000000000" pitchFamily="2" charset="2"/>
-            </a:endParaRPr>
-          </a:p>
-        </p:txBody>
-      </p:sp>
-    </p:spTree>
-    <p:extLst>
-      <p:ext uri="{BB962C8B-B14F-4D97-AF65-F5344CB8AC3E}">
-        <p14:creationId xmlns:p14="http://schemas.microsoft.com/office/powerpoint/2010/main" val="2326750432"/>
       </p:ext>
     </p:extLst>
   </p:cSld>
@@ -6260,6 +6034,443 @@
           <p:cNvPr id="2" name="标题 1">
             <a:extLst>
               <a:ext uri="{FF2B5EF4-FFF2-40B4-BE49-F238E27FC236}">
+                <a16:creationId xmlns:a16="http://schemas.microsoft.com/office/drawing/2014/main" id="{A18EA3A3-240C-42DF-8B01-17CA3AEFFC5E}"/>
+              </a:ext>
+            </a:extLst>
+          </p:cNvPr>
+          <p:cNvSpPr>
+            <a:spLocks noGrp="1"/>
+          </p:cNvSpPr>
+          <p:nvPr>
+            <p:ph type="title"/>
+          </p:nvPr>
+        </p:nvSpPr>
+        <p:spPr/>
+        <p:txBody>
+          <a:bodyPr/>
+          <a:lstStyle/>
+          <a:p>
+            <a:r>
+              <a:rPr lang="zh-CN" altLang="en-US" dirty="0"/>
+              <a:t>卫生宏</a:t>
+            </a:r>
+          </a:p>
+        </p:txBody>
+      </p:sp>
+      <p:sp>
+        <p:nvSpPr>
+          <p:cNvPr id="3" name="内容占位符 2">
+            <a:extLst>
+              <a:ext uri="{FF2B5EF4-FFF2-40B4-BE49-F238E27FC236}">
+                <a16:creationId xmlns:a16="http://schemas.microsoft.com/office/drawing/2014/main" id="{7E812C04-0B88-424A-8943-D63970D4B5AA}"/>
+              </a:ext>
+            </a:extLst>
+          </p:cNvPr>
+          <p:cNvSpPr>
+            <a:spLocks noGrp="1"/>
+          </p:cNvSpPr>
+          <p:nvPr>
+            <p:ph idx="1"/>
+          </p:nvPr>
+        </p:nvSpPr>
+        <p:spPr/>
+        <p:txBody>
+          <a:bodyPr/>
+          <a:lstStyle/>
+          <a:p>
+            <a:r>
+              <a:rPr lang="en-US" altLang="zh-CN" dirty="0"/>
+              <a:t>(Let x 2 (Let x 1 (+ x 1)))</a:t>
+            </a:r>
+          </a:p>
+          <a:p>
+            <a:r>
+              <a:rPr lang="en-US" altLang="zh-CN" dirty="0"/>
+              <a:t>                            ↑</a:t>
+            </a:r>
+          </a:p>
+          <a:p>
+            <a:r>
+              <a:rPr lang="en-US" altLang="zh-CN" dirty="0"/>
+              <a:t>           </a:t>
+            </a:r>
+            <a:r>
+              <a:rPr lang="zh-CN" altLang="en-US" dirty="0"/>
+              <a:t>此处</a:t>
+            </a:r>
+            <a:r>
+              <a:rPr lang="en-US" altLang="zh-CN" dirty="0"/>
+              <a:t>x</a:t>
+            </a:r>
+            <a:r>
+              <a:rPr lang="zh-CN" altLang="en-US" dirty="0"/>
+              <a:t>是</a:t>
+            </a:r>
+            <a:r>
+              <a:rPr lang="en-US" altLang="zh-CN" dirty="0"/>
+              <a:t>1</a:t>
+            </a:r>
+            <a:r>
+              <a:rPr lang="zh-CN" altLang="en-US" dirty="0"/>
+              <a:t>而不是</a:t>
+            </a:r>
+            <a:r>
+              <a:rPr lang="en-US" altLang="zh-CN" dirty="0"/>
+              <a:t>2</a:t>
+            </a:r>
+          </a:p>
+          <a:p>
+            <a:endParaRPr lang="en-US" altLang="zh-CN" dirty="0"/>
+          </a:p>
+          <a:p>
+            <a:r>
+              <a:rPr lang="zh-CN" altLang="en-US" dirty="0"/>
+              <a:t>算法没有对卫生宏特殊处理</a:t>
+            </a:r>
+            <a:endParaRPr lang="en-US" altLang="zh-CN" dirty="0"/>
+          </a:p>
+          <a:p>
+            <a:r>
+              <a:rPr lang="zh-CN" altLang="en-US" dirty="0"/>
+              <a:t>但依然可以解决卫生宏重组糖</a:t>
+            </a:r>
+          </a:p>
+        </p:txBody>
+      </p:sp>
+      <p:sp>
+        <p:nvSpPr>
+          <p:cNvPr id="5" name="矩形: 圆角 4">
+            <a:extLst>
+              <a:ext uri="{FF2B5EF4-FFF2-40B4-BE49-F238E27FC236}">
+                <a16:creationId xmlns:a16="http://schemas.microsoft.com/office/drawing/2014/main" id="{DA2E40B9-8353-4B3E-96FB-13415822F110}"/>
+              </a:ext>
+            </a:extLst>
+          </p:cNvPr>
+          <p:cNvSpPr/>
+          <p:nvPr/>
+        </p:nvSpPr>
+        <p:spPr>
+          <a:xfrm>
+            <a:off x="6096000" y="670243"/>
+            <a:ext cx="4998720" cy="5506720"/>
+          </a:xfrm>
+          <a:prstGeom prst="roundRect">
+            <a:avLst/>
+          </a:prstGeom>
+          <a:solidFill>
+            <a:schemeClr val="bg1"/>
+          </a:solidFill>
+        </p:spPr>
+        <p:style>
+          <a:lnRef idx="2">
+            <a:schemeClr val="accent1">
+              <a:shade val="50000"/>
+            </a:schemeClr>
+          </a:lnRef>
+          <a:fillRef idx="1">
+            <a:schemeClr val="accent1"/>
+          </a:fillRef>
+          <a:effectRef idx="0">
+            <a:schemeClr val="accent1"/>
+          </a:effectRef>
+          <a:fontRef idx="minor">
+            <a:schemeClr val="lt1"/>
+          </a:fontRef>
+        </p:style>
+        <p:txBody>
+          <a:bodyPr rtlCol="0" anchor="ctr"/>
+          <a:lstStyle/>
+          <a:p>
+            <a:pPr algn="ctr"/>
+            <a:r>
+              <a:rPr lang="da-DK" altLang="zh-CN" sz="2000" dirty="0">
+                <a:solidFill>
+                  <a:schemeClr val="tx1"/>
+                </a:solidFill>
+                <a:sym typeface="Wingdings" panose="05000000000000000000" pitchFamily="2" charset="2"/>
+              </a:rPr>
+              <a:t>(Let x (+ 1 2) (+ x (Let x (+ 1 4) (+ x 1))))</a:t>
+            </a:r>
+            <a:endParaRPr lang="en-US" altLang="zh-CN" sz="2000" dirty="0">
+              <a:solidFill>
+                <a:schemeClr val="tx1"/>
+              </a:solidFill>
+              <a:sym typeface="Wingdings" panose="05000000000000000000" pitchFamily="2" charset="2"/>
+            </a:endParaRPr>
+          </a:p>
+          <a:p>
+            <a:pPr algn="ctr"/>
+            <a:r>
+              <a:rPr lang="zh-CN" altLang="en-US" sz="2000" dirty="0">
+                <a:solidFill>
+                  <a:schemeClr val="tx1"/>
+                </a:solidFill>
+              </a:rPr>
+              <a:t>↓</a:t>
+            </a:r>
+            <a:endParaRPr lang="en-US" altLang="zh-CN" sz="2000" dirty="0">
+              <a:solidFill>
+                <a:schemeClr val="tx1"/>
+              </a:solidFill>
+              <a:sym typeface="Wingdings" panose="05000000000000000000" pitchFamily="2" charset="2"/>
+            </a:endParaRPr>
+          </a:p>
+          <a:p>
+            <a:pPr algn="ctr"/>
+            <a:r>
+              <a:rPr lang="da-DK" altLang="zh-CN" sz="2000" dirty="0">
+                <a:solidFill>
+                  <a:schemeClr val="tx1"/>
+                </a:solidFill>
+                <a:sym typeface="Wingdings" panose="05000000000000000000" pitchFamily="2" charset="2"/>
+              </a:rPr>
+              <a:t>(Let x 3 (+ x (Let x (+ 1 4) (+ x 1))))</a:t>
+            </a:r>
+          </a:p>
+          <a:p>
+            <a:pPr algn="ctr"/>
+            <a:r>
+              <a:rPr lang="zh-CN" altLang="en-US" sz="2000" dirty="0">
+                <a:solidFill>
+                  <a:schemeClr val="tx1"/>
+                </a:solidFill>
+              </a:rPr>
+              <a:t>↓</a:t>
+            </a:r>
+            <a:endParaRPr lang="en-US" altLang="zh-CN" sz="2000" dirty="0">
+              <a:solidFill>
+                <a:schemeClr val="tx1"/>
+              </a:solidFill>
+            </a:endParaRPr>
+          </a:p>
+          <a:p>
+            <a:pPr algn="ctr"/>
+            <a:r>
+              <a:rPr lang="da-DK" altLang="zh-CN" sz="2000" dirty="0">
+                <a:solidFill>
+                  <a:schemeClr val="tx1"/>
+                </a:solidFill>
+                <a:sym typeface="Wingdings" panose="05000000000000000000" pitchFamily="2" charset="2"/>
+              </a:rPr>
+              <a:t>((λ (x) (+ x (Let x (+ 1 4) (+ x 1)))) 3)</a:t>
+            </a:r>
+          </a:p>
+          <a:p>
+            <a:pPr algn="ctr"/>
+            <a:r>
+              <a:rPr lang="zh-CN" altLang="en-US" sz="2000" dirty="0">
+                <a:solidFill>
+                  <a:schemeClr val="tx1"/>
+                </a:solidFill>
+              </a:rPr>
+              <a:t>↓</a:t>
+            </a:r>
+            <a:endParaRPr lang="en-US" altLang="zh-CN" sz="2000" dirty="0">
+              <a:solidFill>
+                <a:schemeClr val="tx1"/>
+              </a:solidFill>
+              <a:sym typeface="Wingdings" panose="05000000000000000000" pitchFamily="2" charset="2"/>
+            </a:endParaRPr>
+          </a:p>
+          <a:p>
+            <a:pPr algn="ctr"/>
+            <a:r>
+              <a:rPr lang="da-DK" altLang="zh-CN" sz="2000" dirty="0">
+                <a:solidFill>
+                  <a:schemeClr val="tx1"/>
+                </a:solidFill>
+                <a:sym typeface="Wingdings" panose="05000000000000000000" pitchFamily="2" charset="2"/>
+              </a:rPr>
+              <a:t>(+ 3 (Let x (+ 1 4) (+ x 1)))</a:t>
+            </a:r>
+          </a:p>
+          <a:p>
+            <a:pPr algn="ctr"/>
+            <a:r>
+              <a:rPr lang="zh-CN" altLang="en-US" sz="2000" dirty="0">
+                <a:solidFill>
+                  <a:schemeClr val="tx1"/>
+                </a:solidFill>
+              </a:rPr>
+              <a:t>↓</a:t>
+            </a:r>
+            <a:endParaRPr lang="en-US" altLang="zh-CN" sz="2000" dirty="0">
+              <a:solidFill>
+                <a:schemeClr val="tx1"/>
+              </a:solidFill>
+            </a:endParaRPr>
+          </a:p>
+          <a:p>
+            <a:pPr algn="ctr"/>
+            <a:r>
+              <a:rPr lang="da-DK" altLang="zh-CN" sz="2000" dirty="0">
+                <a:solidFill>
+                  <a:schemeClr val="tx1"/>
+                </a:solidFill>
+                <a:sym typeface="Wingdings" panose="05000000000000000000" pitchFamily="2" charset="2"/>
+              </a:rPr>
+              <a:t>(+ 3 (Let x 5 (+ x 1)))</a:t>
+            </a:r>
+          </a:p>
+          <a:p>
+            <a:pPr algn="ctr"/>
+            <a:r>
+              <a:rPr lang="zh-CN" altLang="en-US" sz="2000" dirty="0">
+                <a:solidFill>
+                  <a:schemeClr val="tx1"/>
+                </a:solidFill>
+              </a:rPr>
+              <a:t>↓</a:t>
+            </a:r>
+            <a:endParaRPr lang="da-DK" altLang="zh-CN" sz="2000" dirty="0">
+              <a:solidFill>
+                <a:schemeClr val="tx1"/>
+              </a:solidFill>
+              <a:sym typeface="Wingdings" panose="05000000000000000000" pitchFamily="2" charset="2"/>
+            </a:endParaRPr>
+          </a:p>
+          <a:p>
+            <a:pPr algn="ctr"/>
+            <a:r>
+              <a:rPr lang="da-DK" altLang="zh-CN" sz="2000" dirty="0">
+                <a:solidFill>
+                  <a:schemeClr val="tx1"/>
+                </a:solidFill>
+                <a:sym typeface="Wingdings" panose="05000000000000000000" pitchFamily="2" charset="2"/>
+              </a:rPr>
+              <a:t>(+ 3 ((λ (x) (+ x 1)) 5))</a:t>
+            </a:r>
+          </a:p>
+          <a:p>
+            <a:pPr algn="ctr"/>
+            <a:r>
+              <a:rPr lang="zh-CN" altLang="en-US" sz="2000" dirty="0">
+                <a:solidFill>
+                  <a:schemeClr val="tx1"/>
+                </a:solidFill>
+              </a:rPr>
+              <a:t>↓</a:t>
+            </a:r>
+            <a:endParaRPr lang="da-DK" altLang="zh-CN" sz="2000" dirty="0">
+              <a:solidFill>
+                <a:schemeClr val="tx1"/>
+              </a:solidFill>
+              <a:sym typeface="Wingdings" panose="05000000000000000000" pitchFamily="2" charset="2"/>
+            </a:endParaRPr>
+          </a:p>
+          <a:p>
+            <a:pPr algn="ctr"/>
+            <a:r>
+              <a:rPr lang="da-DK" altLang="zh-CN" sz="2000" dirty="0">
+                <a:solidFill>
+                  <a:schemeClr val="tx1"/>
+                </a:solidFill>
+                <a:sym typeface="Wingdings" panose="05000000000000000000" pitchFamily="2" charset="2"/>
+              </a:rPr>
+              <a:t>(+ 3 (+ 5 1))</a:t>
+            </a:r>
+          </a:p>
+          <a:p>
+            <a:pPr algn="ctr"/>
+            <a:r>
+              <a:rPr lang="zh-CN" altLang="en-US" sz="2000" dirty="0">
+                <a:solidFill>
+                  <a:schemeClr val="tx1"/>
+                </a:solidFill>
+              </a:rPr>
+              <a:t>↓</a:t>
+            </a:r>
+            <a:endParaRPr lang="da-DK" altLang="zh-CN" sz="2000" dirty="0">
+              <a:solidFill>
+                <a:schemeClr val="tx1"/>
+              </a:solidFill>
+              <a:sym typeface="Wingdings" panose="05000000000000000000" pitchFamily="2" charset="2"/>
+            </a:endParaRPr>
+          </a:p>
+          <a:p>
+            <a:pPr algn="ctr"/>
+            <a:r>
+              <a:rPr lang="da-DK" altLang="zh-CN" sz="2000" dirty="0">
+                <a:solidFill>
+                  <a:schemeClr val="tx1"/>
+                </a:solidFill>
+                <a:sym typeface="Wingdings" panose="05000000000000000000" pitchFamily="2" charset="2"/>
+              </a:rPr>
+              <a:t>(+ 3 6)</a:t>
+            </a:r>
+          </a:p>
+          <a:p>
+            <a:pPr algn="ctr"/>
+            <a:r>
+              <a:rPr lang="zh-CN" altLang="en-US" sz="2000" dirty="0">
+                <a:solidFill>
+                  <a:schemeClr val="tx1"/>
+                </a:solidFill>
+              </a:rPr>
+              <a:t>↓</a:t>
+            </a:r>
+            <a:endParaRPr lang="da-DK" altLang="zh-CN" sz="2000" dirty="0">
+              <a:solidFill>
+                <a:schemeClr val="tx1"/>
+              </a:solidFill>
+              <a:sym typeface="Wingdings" panose="05000000000000000000" pitchFamily="2" charset="2"/>
+            </a:endParaRPr>
+          </a:p>
+          <a:p>
+            <a:pPr algn="ctr"/>
+            <a:r>
+              <a:rPr lang="da-DK" altLang="zh-CN" sz="2000" dirty="0">
+                <a:solidFill>
+                  <a:schemeClr val="tx1"/>
+                </a:solidFill>
+                <a:sym typeface="Wingdings" panose="05000000000000000000" pitchFamily="2" charset="2"/>
+              </a:rPr>
+              <a:t>9</a:t>
+            </a:r>
+            <a:endParaRPr lang="en-US" altLang="zh-CN" sz="2000" dirty="0">
+              <a:solidFill>
+                <a:schemeClr val="tx1"/>
+              </a:solidFill>
+              <a:sym typeface="Wingdings" panose="05000000000000000000" pitchFamily="2" charset="2"/>
+            </a:endParaRPr>
+          </a:p>
+        </p:txBody>
+      </p:sp>
+    </p:spTree>
+    <p:extLst>
+      <p:ext uri="{BB962C8B-B14F-4D97-AF65-F5344CB8AC3E}">
+        <p14:creationId xmlns:p14="http://schemas.microsoft.com/office/powerpoint/2010/main" val="2326750432"/>
+      </p:ext>
+    </p:extLst>
+  </p:cSld>
+  <p:clrMapOvr>
+    <a:masterClrMapping/>
+  </p:clrMapOvr>
+</p:sld>
+</file>
+
+<file path=ppt/slides/slide21.xml><?xml version="1.0" encoding="utf-8"?>
+<p:sld xmlns:a="http://schemas.openxmlformats.org/drawingml/2006/main" xmlns:r="http://schemas.openxmlformats.org/officeDocument/2006/relationships" xmlns:p="http://schemas.openxmlformats.org/presentationml/2006/main">
+  <p:cSld>
+    <p:spTree>
+      <p:nvGrpSpPr>
+        <p:cNvPr id="1" name=""/>
+        <p:cNvGrpSpPr/>
+        <p:nvPr/>
+      </p:nvGrpSpPr>
+      <p:grpSpPr>
+        <a:xfrm>
+          <a:off x="0" y="0"/>
+          <a:ext cx="0" cy="0"/>
+          <a:chOff x="0" y="0"/>
+          <a:chExt cx="0" cy="0"/>
+        </a:xfrm>
+      </p:grpSpPr>
+      <p:sp>
+        <p:nvSpPr>
+          <p:cNvPr id="2" name="标题 1">
+            <a:extLst>
+              <a:ext uri="{FF2B5EF4-FFF2-40B4-BE49-F238E27FC236}">
                 <a16:creationId xmlns:a16="http://schemas.microsoft.com/office/drawing/2014/main" id="{62935782-D1E2-4E3E-9703-90C00FE3E1A7}"/>
               </a:ext>
             </a:extLst>
@@ -6549,7 +6760,7 @@
 </p:sld>
 </file>
 
-<file path=ppt/slides/slide21.xml><?xml version="1.0" encoding="utf-8"?>
+<file path=ppt/slides/slide22.xml><?xml version="1.0" encoding="utf-8"?>
 <p:sld xmlns:a="http://schemas.openxmlformats.org/drawingml/2006/main" xmlns:r="http://schemas.openxmlformats.org/officeDocument/2006/relationships" xmlns:p="http://schemas.openxmlformats.org/presentationml/2006/main">
   <p:cSld>
     <p:spTree>
@@ -6908,6 +7119,145 @@
                 <a:schemeClr val="tx1"/>
               </a:solidFill>
               <a:sym typeface="Wingdings" panose="05000000000000000000" pitchFamily="2" charset="2"/>
+            </a:endParaRPr>
+          </a:p>
+        </p:txBody>
+      </p:sp>
+      <p:sp>
+        <p:nvSpPr>
+          <p:cNvPr id="5" name="矩形: 圆角 4">
+            <a:extLst>
+              <a:ext uri="{FF2B5EF4-FFF2-40B4-BE49-F238E27FC236}">
+                <a16:creationId xmlns:a16="http://schemas.microsoft.com/office/drawing/2014/main" id="{8255EBC8-A9D9-44E0-AFE1-77DD6F62851C}"/>
+              </a:ext>
+            </a:extLst>
+          </p:cNvPr>
+          <p:cNvSpPr/>
+          <p:nvPr/>
+        </p:nvSpPr>
+        <p:spPr>
+          <a:xfrm>
+            <a:off x="3749040" y="365125"/>
+            <a:ext cx="8351520" cy="1028699"/>
+          </a:xfrm>
+          <a:prstGeom prst="roundRect">
+            <a:avLst/>
+          </a:prstGeom>
+          <a:solidFill>
+            <a:schemeClr val="bg1"/>
+          </a:solidFill>
+        </p:spPr>
+        <p:style>
+          <a:lnRef idx="2">
+            <a:schemeClr val="accent1">
+              <a:shade val="50000"/>
+            </a:schemeClr>
+          </a:lnRef>
+          <a:fillRef idx="1">
+            <a:schemeClr val="accent1"/>
+          </a:fillRef>
+          <a:effectRef idx="0">
+            <a:schemeClr val="accent1"/>
+          </a:effectRef>
+          <a:fontRef idx="minor">
+            <a:schemeClr val="lt1"/>
+          </a:fontRef>
+        </p:style>
+        <p:txBody>
+          <a:bodyPr rtlCol="0" anchor="ctr"/>
+          <a:lstStyle/>
+          <a:p>
+            <a:pPr algn="ctr"/>
+            <a:r>
+              <a:rPr lang="en-US" altLang="zh-CN" sz="2000" dirty="0">
+                <a:solidFill>
+                  <a:schemeClr val="tx1"/>
+                </a:solidFill>
+              </a:rPr>
+              <a:t>(map e exp)</a:t>
+            </a:r>
+            <a:r>
+              <a:rPr lang="en-US" altLang="zh-CN" sz="2000" dirty="0">
+                <a:solidFill>
+                  <a:schemeClr val="tx1"/>
+                </a:solidFill>
+                <a:sym typeface="Wingdings" panose="05000000000000000000" pitchFamily="2" charset="2"/>
+              </a:rPr>
+              <a:t>(if (empty? </a:t>
+            </a:r>
+            <a:r>
+              <a:rPr lang="en-US" altLang="zh-CN" sz="2000" dirty="0">
+                <a:solidFill>
+                  <a:schemeClr val="tx1"/>
+                </a:solidFill>
+              </a:rPr>
+              <a:t>Exp)  </a:t>
+            </a:r>
+            <a:r>
+              <a:rPr lang="en-US" altLang="zh-CN" sz="2000" dirty="0">
+                <a:solidFill>
+                  <a:schemeClr val="tx1"/>
+                </a:solidFill>
+                <a:sym typeface="Wingdings" panose="05000000000000000000" pitchFamily="2" charset="2"/>
+              </a:rPr>
+              <a:t>(list) (cons (e (first </a:t>
+            </a:r>
+            <a:r>
+              <a:rPr lang="en-US" altLang="zh-CN" sz="2000" dirty="0">
+                <a:solidFill>
+                  <a:schemeClr val="tx1"/>
+                </a:solidFill>
+              </a:rPr>
+              <a:t>exp</a:t>
+            </a:r>
+            <a:r>
+              <a:rPr lang="en-US" altLang="zh-CN" sz="2000" dirty="0">
+                <a:solidFill>
+                  <a:schemeClr val="tx1"/>
+                </a:solidFill>
+                <a:sym typeface="Wingdings" panose="05000000000000000000" pitchFamily="2" charset="2"/>
+              </a:rPr>
+              <a:t>)) </a:t>
+            </a:r>
+            <a:r>
+              <a:rPr lang="en-US" altLang="zh-CN" sz="2000" dirty="0">
+                <a:solidFill>
+                  <a:srgbClr val="FF0000"/>
+                </a:solidFill>
+                <a:sym typeface="Wingdings" panose="05000000000000000000" pitchFamily="2" charset="2"/>
+              </a:rPr>
+              <a:t>(map e (rest </a:t>
+            </a:r>
+            <a:r>
+              <a:rPr lang="en-US" altLang="zh-CN" sz="2000" dirty="0">
+                <a:solidFill>
+                  <a:srgbClr val="FF0000"/>
+                </a:solidFill>
+              </a:rPr>
+              <a:t>exp</a:t>
+            </a:r>
+            <a:r>
+              <a:rPr lang="en-US" altLang="zh-CN" sz="2000" dirty="0">
+                <a:solidFill>
+                  <a:srgbClr val="FF0000"/>
+                </a:solidFill>
+                <a:sym typeface="Wingdings" panose="05000000000000000000" pitchFamily="2" charset="2"/>
+              </a:rPr>
+              <a:t>))</a:t>
+            </a:r>
+            <a:r>
+              <a:rPr lang="en-US" altLang="zh-CN" sz="2000" dirty="0">
+                <a:solidFill>
+                  <a:schemeClr val="tx1"/>
+                </a:solidFill>
+                <a:sym typeface="Wingdings" panose="05000000000000000000" pitchFamily="2" charset="2"/>
+              </a:rPr>
+              <a:t>))</a:t>
+            </a:r>
+            <a:endParaRPr lang="zh-CN" altLang="en-US" sz="2000" dirty="0">
+              <a:solidFill>
+                <a:schemeClr val="tx1"/>
+              </a:solidFill>
             </a:endParaRPr>
           </a:p>
         </p:txBody>
@@ -7003,7 +7353,7 @@
 </p:sld>
 </file>
 
-<file path=ppt/slides/slide22.xml><?xml version="1.0" encoding="utf-8"?>
+<file path=ppt/slides/slide23.xml><?xml version="1.0" encoding="utf-8"?>
 <p:sld xmlns:a="http://schemas.openxmlformats.org/drawingml/2006/main" xmlns:r="http://schemas.openxmlformats.org/officeDocument/2006/relationships" xmlns:p="http://schemas.openxmlformats.org/presentationml/2006/main">
   <p:cSld>
     <p:spTree>
@@ -7525,7 +7875,7 @@
 </p:sld>
 </file>
 
-<file path=ppt/slides/slide23.xml><?xml version="1.0" encoding="utf-8"?>
+<file path=ppt/slides/slide24.xml><?xml version="1.0" encoding="utf-8"?>
 <p:sld xmlns:a="http://schemas.openxmlformats.org/drawingml/2006/main" xmlns:r="http://schemas.openxmlformats.org/officeDocument/2006/relationships" xmlns:p="http://schemas.openxmlformats.org/presentationml/2006/main">
   <p:cSld>
     <p:spTree>
@@ -7629,7 +7979,7 @@
 </p:sld>
 </file>
 
-<file path=ppt/slides/slide24.xml><?xml version="1.0" encoding="utf-8"?>
+<file path=ppt/slides/slide25.xml><?xml version="1.0" encoding="utf-8"?>
 <p:sld xmlns:a="http://schemas.openxmlformats.org/drawingml/2006/main" xmlns:r="http://schemas.openxmlformats.org/officeDocument/2006/relationships" xmlns:p="http://schemas.openxmlformats.org/presentationml/2006/main">
   <p:cSld>
     <p:spTree>
@@ -10375,7 +10725,7 @@
             </a:r>
             <a:r>
               <a:rPr lang="en-US" altLang="zh-CN" dirty="0"/>
-              <a:t>40</a:t>
+              <a:t>35</a:t>
             </a:r>
             <a:r>
               <a:rPr lang="zh-CN" altLang="en-US" dirty="0"/>

</xml_diff>